<commit_message>
PowerPoint and Release Plan Drafts made
</commit_message>
<xml_diff>
--- a/Intro.slides.template.ppt.pptx
+++ b/Intro.slides.template.ppt.pptx
@@ -382,7 +382,7 @@
   <p:cSld>
     <p:spTree>
       <p:nvGrpSpPr>
-        <p:cNvPr id="53" name="Shape 53"/>
+        <p:cNvPr id="54" name="Shape 54"/>
         <p:cNvGrpSpPr/>
         <p:nvPr/>
       </p:nvGrpSpPr>
@@ -396,7 +396,7 @@
       </p:grpSpPr>
       <p:sp>
         <p:nvSpPr>
-          <p:cNvPr id="54" name="Shape 54"/>
+          <p:cNvPr id="55" name="Shape 55"/>
           <p:cNvSpPr txBox="1"/>
           <p:nvPr>
             <p:ph idx="1" type="body"/>
@@ -432,7 +432,7 @@
       </p:sp>
       <p:sp>
         <p:nvSpPr>
-          <p:cNvPr id="55" name="Shape 55"/>
+          <p:cNvPr id="56" name="Shape 56"/>
           <p:cNvSpPr/>
           <p:nvPr>
             <p:ph idx="2" type="sldImg"/>
@@ -487,7 +487,7 @@
   <p:cSld>
     <p:spTree>
       <p:nvGrpSpPr>
-        <p:cNvPr id="62" name="Shape 62"/>
+        <p:cNvPr id="63" name="Shape 63"/>
         <p:cNvGrpSpPr/>
         <p:nvPr/>
       </p:nvGrpSpPr>
@@ -501,7 +501,7 @@
       </p:grpSpPr>
       <p:sp>
         <p:nvSpPr>
-          <p:cNvPr id="63" name="Shape 63"/>
+          <p:cNvPr id="64" name="Shape 64"/>
           <p:cNvSpPr txBox="1"/>
           <p:nvPr>
             <p:ph idx="1" type="body"/>
@@ -537,7 +537,7 @@
       </p:sp>
       <p:sp>
         <p:nvSpPr>
-          <p:cNvPr id="64" name="Shape 64"/>
+          <p:cNvPr id="65" name="Shape 65"/>
           <p:cNvSpPr/>
           <p:nvPr>
             <p:ph idx="2" type="sldImg"/>
@@ -592,7 +592,7 @@
   <p:cSld>
     <p:spTree>
       <p:nvGrpSpPr>
-        <p:cNvPr id="71" name="Shape 71"/>
+        <p:cNvPr id="72" name="Shape 72"/>
         <p:cNvGrpSpPr/>
         <p:nvPr/>
       </p:nvGrpSpPr>
@@ -606,7 +606,7 @@
       </p:grpSpPr>
       <p:sp>
         <p:nvSpPr>
-          <p:cNvPr id="72" name="Shape 72"/>
+          <p:cNvPr id="73" name="Shape 73"/>
           <p:cNvSpPr txBox="1"/>
           <p:nvPr>
             <p:ph idx="1" type="body"/>
@@ -642,7 +642,7 @@
       </p:sp>
       <p:sp>
         <p:nvSpPr>
-          <p:cNvPr id="73" name="Shape 73"/>
+          <p:cNvPr id="74" name="Shape 74"/>
           <p:cNvSpPr/>
           <p:nvPr>
             <p:ph idx="2" type="sldImg"/>
@@ -4695,7 +4695,7 @@
                 <a:spcPct val="100000"/>
               </a:lnSpc>
               <a:spcBef>
-                <a:spcPts val="0"/>
+                <a:spcPts val="560"/>
               </a:spcBef>
               <a:spcAft>
                 <a:spcPts val="0"/>
@@ -4703,13 +4703,56 @@
               <a:buClr>
                 <a:schemeClr val="dk1"/>
               </a:buClr>
-              <a:buFont typeface="Calibri"/>
+              <a:buSzPct val="25000"/>
+              <a:buFont typeface="Times New Roman"/>
+              <a:buNone/>
+            </a:pPr>
+            <a:r>
+              <a:rPr b="1" sz="2800" lang="en-US">
+                <a:solidFill>
+                  <a:schemeClr val="dk1"/>
+                </a:solidFill>
+                <a:latin typeface="Times New Roman"/>
+                <a:ea typeface="Times New Roman"/>
+                <a:cs typeface="Times New Roman"/>
+                <a:sym typeface="Times New Roman"/>
+              </a:rPr>
+              <a:t>Project Sponsor:</a:t>
+            </a:r>
+            <a:r>
+              <a:rPr sz="2800" lang="en-US">
+                <a:solidFill>
+                  <a:schemeClr val="dk1"/>
+                </a:solidFill>
+                <a:latin typeface="Times New Roman"/>
+                <a:ea typeface="Times New Roman"/>
+                <a:cs typeface="Times New Roman"/>
+                <a:sym typeface="Times New Roman"/>
+              </a:rPr>
+              <a:t> Ted East</a:t>
+            </a:r>
+          </a:p>
+          <a:p>
+            <a:pPr algn="l" rtl="0" lvl="0" marR="0" indent="0" marL="0">
+              <a:lnSpc>
+                <a:spcPct val="100000"/>
+              </a:lnSpc>
+              <a:spcBef>
+                <a:spcPts val="560"/>
+              </a:spcBef>
+              <a:spcAft>
+                <a:spcPts val="0"/>
+              </a:spcAft>
+              <a:buClr>
+                <a:schemeClr val="dk1"/>
+              </a:buClr>
+              <a:buFont typeface="Times New Roman"/>
               <a:buNone/>
             </a:pPr>
             <a:r>
               <a:t/>
             </a:r>
-            <a:endParaRPr strike="noStrike" u="none" b="0" cap="none" baseline="0" sz="2800" i="0">
+            <a:endParaRPr sz="1000">
               <a:solidFill>
                 <a:schemeClr val="dk1"/>
               </a:solidFill>
@@ -4738,7 +4781,7 @@
               <a:buNone/>
             </a:pPr>
             <a:r>
-              <a:rPr strike="noStrike" u="none" b="0" cap="none" baseline="0" sz="2800" lang="en-US" i="0">
+              <a:rPr strike="noStrike" u="none" b="1" cap="none" baseline="0" sz="2800" lang="en-US" i="0">
                 <a:solidFill>
                   <a:schemeClr val="dk1"/>
                 </a:solidFill>
@@ -4747,10 +4790,65 @@
                 <a:cs typeface="Times New Roman"/>
                 <a:sym typeface="Times New Roman"/>
               </a:rPr>
-              <a:t>Contact from company or organization</a:t>
+              <a:t>Product Owner</a:t>
             </a:r>
             <a:r>
-              <a:rPr strike="noStrike" u="none" b="0" cap="none" baseline="0" sz="2400" lang="en-US" i="0">
+              <a:rPr b="1" sz="2800" lang="en-US">
+                <a:solidFill>
+                  <a:schemeClr val="dk1"/>
+                </a:solidFill>
+                <a:latin typeface="Times New Roman"/>
+                <a:ea typeface="Times New Roman"/>
+                <a:cs typeface="Times New Roman"/>
+                <a:sym typeface="Times New Roman"/>
+              </a:rPr>
+              <a:t>:</a:t>
+            </a:r>
+            <a:r>
+              <a:rPr sz="2800" lang="en-US">
+                <a:solidFill>
+                  <a:schemeClr val="dk1"/>
+                </a:solidFill>
+                <a:latin typeface="Times New Roman"/>
+                <a:ea typeface="Times New Roman"/>
+                <a:cs typeface="Times New Roman"/>
+                <a:sym typeface="Times New Roman"/>
+              </a:rPr>
+              <a:t> Alejandro Aguilar</a:t>
+            </a:r>
+          </a:p>
+          <a:p>
+            <a:pPr algn="l" rtl="0" lvl="0" marR="0" indent="0" marL="0">
+              <a:lnSpc>
+                <a:spcPct val="100000"/>
+              </a:lnSpc>
+              <a:spcBef>
+                <a:spcPts val="560"/>
+              </a:spcBef>
+              <a:spcAft>
+                <a:spcPts val="0"/>
+              </a:spcAft>
+              <a:buClr>
+                <a:schemeClr val="dk1"/>
+              </a:buClr>
+              <a:buSzPct val="25000"/>
+              <a:buFont typeface="Times New Roman"/>
+              <a:buNone/>
+            </a:pPr>
+            <a:r>
+              <a:rPr b="1" sz="2800" lang="en-US">
+                <a:solidFill>
+                  <a:schemeClr val="dk1"/>
+                </a:solidFill>
+                <a:latin typeface="Times New Roman"/>
+                <a:ea typeface="Times New Roman"/>
+                <a:cs typeface="Times New Roman"/>
+                <a:sym typeface="Times New Roman"/>
+              </a:rPr>
+              <a:t>Team members:</a:t>
+            </a:r>
+            <a:r>
+              <a:rPr sz="2800" lang="en-US">
                 <a:solidFill>
                   <a:schemeClr val="dk1"/>
                 </a:solidFill>
@@ -4762,7 +4860,7 @@
               <a:t> </a:t>
             </a:r>
             <a:r>
-              <a:rPr strike="noStrike" u="none" b="0" cap="none" baseline="0" sz="2000" lang="en-US" i="0">
+              <a:rPr sz="2400" lang="en-US">
                 <a:solidFill>
                   <a:schemeClr val="dk1"/>
                 </a:solidFill>
@@ -4771,7 +4869,7 @@
                 <a:cs typeface="Times New Roman"/>
                 <a:sym typeface="Times New Roman"/>
               </a:rPr>
-              <a:t>(if applicable)</a:t>
+              <a:t>Leland Miller ; Aravind Sambamoorthy </a:t>
             </a:r>
           </a:p>
           <a:p>
@@ -4788,42 +4886,12 @@
               <a:buClr>
                 <a:schemeClr val="dk1"/>
               </a:buClr>
-              <a:buFont typeface="Calibri"/>
+              <a:buSzPct val="25000"/>
+              <a:buFont typeface="Times New Roman"/>
               <a:buNone/>
             </a:pPr>
             <a:r>
-              <a:t/>
-            </a:r>
-            <a:endParaRPr strike="noStrike" u="none" b="0" cap="none" baseline="0" sz="2800" i="0">
-              <a:solidFill>
-                <a:schemeClr val="dk1"/>
-              </a:solidFill>
-              <a:latin typeface="Times New Roman"/>
-              <a:ea typeface="Times New Roman"/>
-              <a:cs typeface="Times New Roman"/>
-              <a:sym typeface="Times New Roman"/>
-            </a:endParaRPr>
-          </a:p>
-          <a:p>
-            <a:pPr algn="l" rtl="0" lvl="0" marR="0" indent="0" marL="0">
-              <a:lnSpc>
-                <a:spcPct val="100000"/>
-              </a:lnSpc>
-              <a:spcBef>
-                <a:spcPts val="560"/>
-              </a:spcBef>
-              <a:spcAft>
-                <a:spcPts val="0"/>
-              </a:spcAft>
-              <a:buClr>
-                <a:schemeClr val="dk1"/>
-              </a:buClr>
-              <a:buSzPct val="25000"/>
-              <a:buFont typeface="Times New Roman"/>
-              <a:buNone/>
-            </a:pPr>
-            <a:r>
-              <a:rPr strike="noStrike" u="none" b="0" cap="none" baseline="0" sz="2800" lang="en-US" i="0">
+              <a:rPr sz="2400" lang="en-US">
                 <a:solidFill>
                   <a:schemeClr val="dk1"/>
                 </a:solidFill>
@@ -4832,11 +4900,11 @@
                 <a:cs typeface="Times New Roman"/>
                 <a:sym typeface="Times New Roman"/>
               </a:rPr>
-              <a:t>Team member names (indicate Product Owner)</a:t>
+              <a:t>Hemant Ramachandran ;  Nikolai Kallhovde</a:t>
             </a:r>
           </a:p>
           <a:p>
-            <a:pPr algn="ctr" rtl="0" lvl="0" marR="0" indent="0" marL="0">
+            <a:pPr algn="l" rtl="0" lvl="0" marR="0" indent="0" marL="0">
               <a:lnSpc>
                 <a:spcPct val="100000"/>
               </a:lnSpc>
@@ -4849,72 +4917,12 @@
               <a:buClr>
                 <a:schemeClr val="dk1"/>
               </a:buClr>
-              <a:buFont typeface="Calibri"/>
+              <a:buSzPct val="25000"/>
+              <a:buFont typeface="Times New Roman"/>
               <a:buNone/>
             </a:pPr>
             <a:r>
-              <a:t/>
-            </a:r>
-            <a:endParaRPr strike="noStrike" u="none" b="0" cap="none" baseline="0" sz="2800" i="0">
-              <a:solidFill>
-                <a:schemeClr val="dk1"/>
-              </a:solidFill>
-              <a:latin typeface="Times New Roman"/>
-              <a:ea typeface="Times New Roman"/>
-              <a:cs typeface="Times New Roman"/>
-              <a:sym typeface="Times New Roman"/>
-            </a:endParaRPr>
-          </a:p>
-          <a:p>
-            <a:pPr algn="ctr" rtl="0" lvl="0" marR="0" indent="0" marL="0">
-              <a:lnSpc>
-                <a:spcPct val="100000"/>
-              </a:lnSpc>
-              <a:spcBef>
-                <a:spcPts val="560"/>
-              </a:spcBef>
-              <a:spcAft>
-                <a:spcPts val="0"/>
-              </a:spcAft>
-              <a:buClr>
-                <a:schemeClr val="dk1"/>
-              </a:buClr>
-              <a:buFont typeface="Calibri"/>
-              <a:buNone/>
-            </a:pPr>
-            <a:r>
-              <a:t/>
-            </a:r>
-            <a:endParaRPr strike="noStrike" u="none" b="0" cap="none" baseline="0" sz="2800" i="0">
-              <a:solidFill>
-                <a:schemeClr val="dk1"/>
-              </a:solidFill>
-              <a:latin typeface="Times New Roman"/>
-              <a:ea typeface="Times New Roman"/>
-              <a:cs typeface="Times New Roman"/>
-              <a:sym typeface="Times New Roman"/>
-            </a:endParaRPr>
-          </a:p>
-          <a:p>
-            <a:pPr algn="ctr" rtl="0" lvl="0" marR="0" indent="0" marL="0">
-              <a:lnSpc>
-                <a:spcPct val="100000"/>
-              </a:lnSpc>
-              <a:spcBef>
-                <a:spcPts val="640"/>
-              </a:spcBef>
-              <a:spcAft>
-                <a:spcPts val="0"/>
-              </a:spcAft>
-              <a:buClr>
-                <a:schemeClr val="dk1"/>
-              </a:buClr>
-              <a:buSzPct val="25000"/>
-              <a:buFont typeface="Times New Roman"/>
-              <a:buNone/>
-            </a:pPr>
-            <a:r>
-              <a:rPr strike="noStrike" u="none" b="0" cap="none" baseline="0" sz="3200" lang="en-US" i="0">
+              <a:rPr sz="2400" lang="en-US">
                 <a:solidFill>
                   <a:schemeClr val="dk1"/>
                 </a:solidFill>
@@ -4923,20 +4931,61 @@
                 <a:cs typeface="Times New Roman"/>
                 <a:sym typeface="Times New Roman"/>
               </a:rPr>
-              <a:t>Company or organization logo </a:t>
+              <a:t>Wallace Luk ; </a:t>
             </a:r>
+          </a:p>
+          <a:p>
+            <a:pPr algn="l" rtl="0" lvl="0" marR="0" indent="0" marL="0">
+              <a:lnSpc>
+                <a:spcPct val="100000"/>
+              </a:lnSpc>
+              <a:spcBef>
+                <a:spcPts val="560"/>
+              </a:spcBef>
+              <a:spcAft>
+                <a:spcPts val="0"/>
+              </a:spcAft>
+              <a:buClr>
+                <a:schemeClr val="dk1"/>
+              </a:buClr>
+              <a:buSzPct val="25000"/>
+              <a:buFont typeface="Times New Roman"/>
+              <a:buNone/>
+            </a:pPr>
             <a:r>
-              <a:rPr strike="noStrike" u="none" b="0" cap="none" baseline="0" sz="2000" lang="en-US" i="0">
+              <a:rPr sz="2400" lang="en-US">
                 <a:solidFill>
-                  <a:srgbClr val="000000"/>
+                  <a:schemeClr val="dk1"/>
                 </a:solidFill>
                 <a:latin typeface="Times New Roman"/>
                 <a:ea typeface="Times New Roman"/>
                 <a:cs typeface="Times New Roman"/>
                 <a:sym typeface="Times New Roman"/>
               </a:rPr>
-              <a:t>(if applicable)</a:t>
+              <a:t>Navjot Singh</a:t>
             </a:r>
+          </a:p>
+          <a:p>
+            <a:pPr algn="ctr" rtl="0" lvl="0" marR="0" indent="0" marL="0">
+              <a:lnSpc>
+                <a:spcPct val="100000"/>
+              </a:lnSpc>
+              <a:spcBef>
+                <a:spcPts val="640"/>
+              </a:spcBef>
+              <a:spcAft>
+                <a:spcPts val="0"/>
+              </a:spcAft>
+              <a:buClr>
+                <a:schemeClr val="dk1"/>
+              </a:buClr>
+              <a:buFont typeface="Times New Roman"/>
+              <a:buNone/>
+            </a:pPr>
+            <a:r>
+              <a:t/>
+            </a:r>
+            <a:endParaRPr/>
           </a:p>
         </p:txBody>
       </p:sp>
@@ -4985,7 +5034,7 @@
               <a:buNone/>
             </a:pPr>
             <a:r>
-              <a:rPr strike="noStrike" u="none" b="0" cap="none" baseline="0" sz="3600" lang="en-US" i="0">
+              <a:rPr sz="3600" lang="en-US">
                 <a:solidFill>
                   <a:schemeClr val="dk1"/>
                 </a:solidFill>
@@ -4994,10 +5043,10 @@
                 <a:cs typeface="Times New Roman"/>
                 <a:sym typeface="Times New Roman"/>
               </a:rPr>
-              <a:t>[Date]</a:t>
+              <a:t>10/15/2014</a:t>
             </a:r>
-            <a:br>
-              <a:rPr strike="noStrike" u="none" b="0" cap="none" baseline="0" sz="4000" lang="en-US" i="0">
+            <a:r>
+              <a:rPr sz="4000" lang="en-US">
                 <a:solidFill>
                   <a:schemeClr val="dk1"/>
                 </a:solidFill>
@@ -5006,18 +5055,7 @@
                 <a:cs typeface="Times New Roman"/>
                 <a:sym typeface="Times New Roman"/>
               </a:rPr>
-            </a:br>
-            <a:r>
-              <a:rPr strike="noStrike" u="none" b="0" cap="none" baseline="0" sz="4000" lang="en-US" i="0">
-                <a:solidFill>
-                  <a:schemeClr val="dk1"/>
-                </a:solidFill>
-                <a:latin typeface="Times New Roman"/>
-                <a:ea typeface="Times New Roman"/>
-                <a:cs typeface="Times New Roman"/>
-                <a:sym typeface="Times New Roman"/>
-              </a:rPr>
-              <a:t>[Company Name/Project Title] </a:t>
+              <a:t>Arduino Micro-Controller for EVs</a:t>
             </a:r>
           </a:p>
         </p:txBody>
@@ -5087,6 +5125,34 @@
           </a:p>
         </p:txBody>
       </p:sp>
+      <p:pic>
+        <p:nvPicPr>
+          <p:cNvPr id="53" name="Shape 53"/>
+          <p:cNvPicPr preferRelativeResize="0"/>
+          <p:nvPr/>
+        </p:nvPicPr>
+        <p:blipFill>
+          <a:blip r:embed="rId4">
+            <a:alphaModFix/>
+          </a:blip>
+          <a:stretch>
+            <a:fillRect/>
+          </a:stretch>
+        </p:blipFill>
+        <p:spPr>
+          <a:xfrm>
+            <a:off y="4773600" x="5324512"/>
+            <a:ext cy="1352550" cx="3629025"/>
+          </a:xfrm>
+          <a:prstGeom prst="rect">
+            <a:avLst/>
+          </a:prstGeom>
+          <a:noFill/>
+          <a:ln>
+            <a:noFill/>
+          </a:ln>
+        </p:spPr>
+      </p:pic>
     </p:spTree>
   </p:cSld>
   <p:clrMapOvr>
@@ -5103,7 +5169,7 @@
   <p:cSld>
     <p:spTree>
       <p:nvGrpSpPr>
-        <p:cNvPr id="56" name="Shape 56"/>
+        <p:cNvPr id="57" name="Shape 57"/>
         <p:cNvGrpSpPr/>
         <p:nvPr/>
       </p:nvGrpSpPr>
@@ -5117,7 +5183,7 @@
       </p:grpSpPr>
       <p:sp>
         <p:nvSpPr>
-          <p:cNvPr id="57" name="Shape 57"/>
+          <p:cNvPr id="58" name="Shape 58"/>
           <p:cNvSpPr txBox="1"/>
           <p:nvPr/>
         </p:nvSpPr>
@@ -5182,7 +5248,7 @@
       </p:sp>
       <p:pic>
         <p:nvPicPr>
-          <p:cNvPr id="58" name="Shape 58"/>
+          <p:cNvPr id="59" name="Shape 59"/>
           <p:cNvPicPr preferRelativeResize="0"/>
           <p:nvPr/>
         </p:nvPicPr>
@@ -5209,7 +5275,7 @@
       </p:pic>
       <p:sp>
         <p:nvSpPr>
-          <p:cNvPr id="59" name="Shape 59"/>
+          <p:cNvPr id="60" name="Shape 60"/>
           <p:cNvSpPr txBox="1"/>
           <p:nvPr/>
         </p:nvSpPr>
@@ -5266,7 +5332,7 @@
       </p:sp>
       <p:sp>
         <p:nvSpPr>
-          <p:cNvPr id="60" name="Shape 60"/>
+          <p:cNvPr id="61" name="Shape 61"/>
           <p:cNvSpPr txBox="1"/>
           <p:nvPr>
             <p:ph type="title"/>
@@ -5291,16 +5357,10 @@
           </a:bodyPr>
           <a:lstStyle/>
           <a:p>
-            <a:pPr algn="ctr" rtl="0" lvl="0" marR="0" indent="0" marL="0">
-              <a:lnSpc>
-                <a:spcPct val="100000"/>
-              </a:lnSpc>
-              <a:spcBef>
-                <a:spcPts val="0"/>
-              </a:spcBef>
-              <a:spcAft>
-                <a:spcPts val="0"/>
-              </a:spcAft>
+            <a:pPr rtl="0" lvl="0">
+              <a:spcBef>
+                <a:spcPts val="0"/>
+              </a:spcBef>
               <a:buClr>
                 <a:schemeClr val="dk1"/>
               </a:buClr>
@@ -5309,7 +5369,7 @@
               <a:buNone/>
             </a:pPr>
             <a:r>
-              <a:rPr strike="noStrike" u="none" b="0" cap="none" baseline="0" sz="4400" lang="en-US" i="0">
+              <a:rPr sz="4000" lang="en-US">
                 <a:solidFill>
                   <a:schemeClr val="dk1"/>
                 </a:solidFill>
@@ -5318,14 +5378,14 @@
                 <a:cs typeface="Times New Roman"/>
                 <a:sym typeface="Times New Roman"/>
               </a:rPr>
-              <a:t>[Company Name/Project Title] </a:t>
+              <a:t>Arduino Micro-Controller for EVs</a:t>
             </a:r>
           </a:p>
         </p:txBody>
       </p:sp>
       <p:sp>
         <p:nvSpPr>
-          <p:cNvPr id="61" name="Shape 61"/>
+          <p:cNvPr id="62" name="Shape 62"/>
           <p:cNvSpPr txBox="1"/>
           <p:nvPr>
             <p:ph idx="1" type="body"/>
@@ -5368,7 +5428,7 @@
               <a:buNone/>
             </a:pPr>
             <a:r>
-              <a:rPr strike="noStrike" u="none" b="0" cap="none" baseline="0" sz="3200" lang="en-US" i="0">
+              <a:rPr sz="3200" lang="en-US">
                 <a:solidFill>
                   <a:schemeClr val="dk1"/>
                 </a:solidFill>
@@ -5377,7 +5437,7 @@
                 <a:cs typeface="Times New Roman"/>
                 <a:sym typeface="Times New Roman"/>
               </a:rPr>
-              <a:t>1-2 sentences briefly describing project/problem and high level goals</a:t>
+              <a:t>Transform proprietary microcontroller capabilities of electric vehicle into open source code for the Arduino microcontroller. Add additional functionality as specified. </a:t>
             </a:r>
           </a:p>
         </p:txBody>
@@ -5398,7 +5458,7 @@
   <p:cSld>
     <p:spTree>
       <p:nvGrpSpPr>
-        <p:cNvPr id="65" name="Shape 65"/>
+        <p:cNvPr id="66" name="Shape 66"/>
         <p:cNvGrpSpPr/>
         <p:nvPr/>
       </p:nvGrpSpPr>
@@ -5412,7 +5472,7 @@
       </p:grpSpPr>
       <p:pic>
         <p:nvPicPr>
-          <p:cNvPr id="66" name="Shape 66"/>
+          <p:cNvPr id="67" name="Shape 67"/>
           <p:cNvPicPr preferRelativeResize="0"/>
           <p:nvPr/>
         </p:nvPicPr>
@@ -5439,7 +5499,7 @@
       </p:pic>
       <p:sp>
         <p:nvSpPr>
-          <p:cNvPr id="67" name="Shape 67"/>
+          <p:cNvPr id="68" name="Shape 68"/>
           <p:cNvSpPr txBox="1"/>
           <p:nvPr/>
         </p:nvSpPr>
@@ -5496,7 +5556,7 @@
       </p:sp>
       <p:sp>
         <p:nvSpPr>
-          <p:cNvPr id="68" name="Shape 68"/>
+          <p:cNvPr id="69" name="Shape 69"/>
           <p:cNvSpPr txBox="1"/>
           <p:nvPr>
             <p:ph type="title"/>
@@ -5521,16 +5581,10 @@
           </a:bodyPr>
           <a:lstStyle/>
           <a:p>
-            <a:pPr algn="ctr" rtl="0" lvl="0" marR="0" indent="0" marL="0">
-              <a:lnSpc>
-                <a:spcPct val="100000"/>
-              </a:lnSpc>
-              <a:spcBef>
-                <a:spcPts val="0"/>
-              </a:spcBef>
-              <a:spcAft>
-                <a:spcPts val="0"/>
-              </a:spcAft>
+            <a:pPr rtl="0" lvl="0">
+              <a:spcBef>
+                <a:spcPts val="0"/>
+              </a:spcBef>
               <a:buClr>
                 <a:schemeClr val="dk1"/>
               </a:buClr>
@@ -5539,7 +5593,7 @@
               <a:buNone/>
             </a:pPr>
             <a:r>
-              <a:rPr strike="noStrike" u="none" b="0" cap="none" baseline="0" sz="4400" lang="en-US" i="0">
+              <a:rPr sz="4000" lang="en-US">
                 <a:solidFill>
                   <a:schemeClr val="dk1"/>
                 </a:solidFill>
@@ -5548,14 +5602,14 @@
                 <a:cs typeface="Times New Roman"/>
                 <a:sym typeface="Times New Roman"/>
               </a:rPr>
-              <a:t>[Company Name/Project Title] </a:t>
+              <a:t>Arduino Micro-Controller for EVs</a:t>
             </a:r>
           </a:p>
         </p:txBody>
       </p:sp>
       <p:sp>
         <p:nvSpPr>
-          <p:cNvPr id="69" name="Shape 69"/>
+          <p:cNvPr id="70" name="Shape 70"/>
           <p:cNvSpPr txBox="1"/>
           <p:nvPr>
             <p:ph idx="1" type="body"/>
@@ -5607,7 +5661,212 @@
                 <a:cs typeface="Times New Roman"/>
                 <a:sym typeface="Times New Roman"/>
               </a:rPr>
-              <a:t>Sprint 1 user stories </a:t>
+              <a:t>Sprint 1 </a:t>
+            </a:r>
+          </a:p>
+          <a:p>
+            <a:pPr algn="l" rtl="0" lvl="0" marR="0" indent="-355600" marL="457200">
+              <a:lnSpc>
+                <a:spcPct val="100000"/>
+              </a:lnSpc>
+              <a:spcBef>
+                <a:spcPts val="0"/>
+              </a:spcBef>
+              <a:spcAft>
+                <a:spcPts val="0"/>
+              </a:spcAft>
+              <a:buClr>
+                <a:schemeClr val="dk1"/>
+              </a:buClr>
+              <a:buSzPct val="100000"/>
+              <a:buFont typeface="Times New Roman"/>
+              <a:buChar char="•"/>
+            </a:pPr>
+            <a:r>
+              <a:rPr sz="2000" lang="en-US">
+                <a:solidFill>
+                  <a:schemeClr val="dk1"/>
+                </a:solidFill>
+                <a:latin typeface="Times New Roman"/>
+                <a:ea typeface="Times New Roman"/>
+                <a:cs typeface="Times New Roman"/>
+                <a:sym typeface="Times New Roman"/>
+              </a:rPr>
+              <a:t>Analyze existing microcontroller functionality</a:t>
+            </a:r>
+          </a:p>
+          <a:p>
+            <a:pPr rtl="0" lvl="0" indent="-355600" marL="457200">
+              <a:spcBef>
+                <a:spcPts val="0"/>
+              </a:spcBef>
+              <a:buClr>
+                <a:schemeClr val="dk1"/>
+              </a:buClr>
+              <a:buSzPct val="100000"/>
+              <a:buFont typeface="Times New Roman"/>
+              <a:buChar char="•"/>
+            </a:pPr>
+            <a:r>
+              <a:rPr sz="2000" lang="en-US">
+                <a:solidFill>
+                  <a:schemeClr val="dk1"/>
+                </a:solidFill>
+                <a:latin typeface="Times New Roman"/>
+                <a:ea typeface="Times New Roman"/>
+                <a:cs typeface="Times New Roman"/>
+                <a:sym typeface="Times New Roman"/>
+              </a:rPr>
+              <a:t>Understand Arduino capabilities</a:t>
+            </a:r>
+          </a:p>
+          <a:p>
+            <a:pPr rtl="0" lvl="0" indent="-355600" marL="457200">
+              <a:spcBef>
+                <a:spcPts val="0"/>
+              </a:spcBef>
+              <a:buClr>
+                <a:schemeClr val="dk1"/>
+              </a:buClr>
+              <a:buSzPct val="100000"/>
+              <a:buFont typeface="Times New Roman"/>
+              <a:buChar char="•"/>
+            </a:pPr>
+            <a:r>
+              <a:rPr sz="2000" lang="en-US">
+                <a:solidFill>
+                  <a:schemeClr val="dk1"/>
+                </a:solidFill>
+                <a:latin typeface="Times New Roman"/>
+                <a:ea typeface="Times New Roman"/>
+                <a:cs typeface="Times New Roman"/>
+                <a:sym typeface="Times New Roman"/>
+              </a:rPr>
+              <a:t>Detect currently available input sensors</a:t>
+            </a:r>
+          </a:p>
+          <a:p>
+            <a:pPr algn="l" rtl="0" lvl="0" marR="0" indent="0" marL="0">
+              <a:lnSpc>
+                <a:spcPct val="100000"/>
+              </a:lnSpc>
+              <a:spcBef>
+                <a:spcPts val="640"/>
+              </a:spcBef>
+              <a:spcAft>
+                <a:spcPts val="0"/>
+              </a:spcAft>
+              <a:buClr>
+                <a:schemeClr val="dk1"/>
+              </a:buClr>
+              <a:buSzPct val="25000"/>
+              <a:buFont typeface="Times New Roman"/>
+              <a:buNone/>
+            </a:pPr>
+            <a:r>
+              <a:rPr strike="noStrike" u="none" b="0" cap="none" baseline="0" sz="3200" lang="en-US" i="0">
+                <a:solidFill>
+                  <a:schemeClr val="dk1"/>
+                </a:solidFill>
+                <a:latin typeface="Times New Roman"/>
+                <a:ea typeface="Times New Roman"/>
+                <a:cs typeface="Times New Roman"/>
+                <a:sym typeface="Times New Roman"/>
+              </a:rPr>
+              <a:t>Sprint 2 </a:t>
+            </a:r>
+          </a:p>
+          <a:p>
+            <a:pPr algn="l" rtl="0" lvl="0" marR="0" indent="-355600" marL="457200">
+              <a:lnSpc>
+                <a:spcPct val="100000"/>
+              </a:lnSpc>
+              <a:spcBef>
+                <a:spcPts val="640"/>
+              </a:spcBef>
+              <a:spcAft>
+                <a:spcPts val="0"/>
+              </a:spcAft>
+              <a:buClr>
+                <a:schemeClr val="dk1"/>
+              </a:buClr>
+              <a:buSzPct val="100000"/>
+              <a:buFont typeface="Times New Roman"/>
+              <a:buChar char="•"/>
+            </a:pPr>
+            <a:r>
+              <a:rPr sz="2000" lang="en-US">
+                <a:solidFill>
+                  <a:schemeClr val="dk1"/>
+                </a:solidFill>
+                <a:latin typeface="Times New Roman"/>
+                <a:ea typeface="Times New Roman"/>
+                <a:cs typeface="Times New Roman"/>
+                <a:sym typeface="Times New Roman"/>
+              </a:rPr>
+              <a:t>Coming Soon</a:t>
+            </a:r>
+          </a:p>
+          <a:p>
+            <a:pPr algn="l" rtl="0" lvl="0" marR="0" indent="0" marL="0">
+              <a:lnSpc>
+                <a:spcPct val="100000"/>
+              </a:lnSpc>
+              <a:spcBef>
+                <a:spcPts val="640"/>
+              </a:spcBef>
+              <a:spcAft>
+                <a:spcPts val="0"/>
+              </a:spcAft>
+              <a:buClr>
+                <a:schemeClr val="dk1"/>
+              </a:buClr>
+              <a:buSzPct val="25000"/>
+              <a:buFont typeface="Times New Roman"/>
+              <a:buNone/>
+            </a:pPr>
+            <a:r>
+              <a:rPr strike="noStrike" u="none" b="0" cap="none" baseline="0" sz="3200" lang="en-US" i="0">
+                <a:solidFill>
+                  <a:schemeClr val="dk1"/>
+                </a:solidFill>
+                <a:latin typeface="Times New Roman"/>
+                <a:ea typeface="Times New Roman"/>
+                <a:cs typeface="Times New Roman"/>
+                <a:sym typeface="Times New Roman"/>
+              </a:rPr>
+              <a:t>Sprint 3</a:t>
+            </a:r>
+          </a:p>
+          <a:p>
+            <a:pPr algn="l" rtl="0" lvl="0" marR="0" indent="-355600" marL="457200">
+              <a:lnSpc>
+                <a:spcPct val="100000"/>
+              </a:lnSpc>
+              <a:spcBef>
+                <a:spcPts val="640"/>
+              </a:spcBef>
+              <a:spcAft>
+                <a:spcPts val="0"/>
+              </a:spcAft>
+              <a:buClr>
+                <a:schemeClr val="dk1"/>
+              </a:buClr>
+              <a:buSzPct val="100000"/>
+              <a:buFont typeface="Times New Roman"/>
+              <a:buChar char="•"/>
+            </a:pPr>
+            <a:r>
+              <a:rPr sz="2000" lang="en-US">
+                <a:solidFill>
+                  <a:schemeClr val="dk1"/>
+                </a:solidFill>
+                <a:latin typeface="Times New Roman"/>
+                <a:ea typeface="Times New Roman"/>
+                <a:cs typeface="Times New Roman"/>
+                <a:sym typeface="Times New Roman"/>
+              </a:rPr>
+              <a:t>Coming Soon</a:t>
             </a:r>
             <a:r>
               <a:rPr strike="noStrike" u="none" b="0" cap="none" baseline="0" sz="2000" lang="en-US" i="0">
@@ -5619,120 +5878,14 @@
                 <a:cs typeface="Times New Roman"/>
                 <a:sym typeface="Times New Roman"/>
               </a:rPr>
-              <a:t>each labeled with assoc. high-level goal</a:t>
+              <a:t> </a:t>
             </a:r>
-          </a:p>
-          <a:p>
-            <a:pPr algn="l" rtl="0" lvl="0" marR="0" indent="0" marL="0">
-              <a:lnSpc>
-                <a:spcPct val="100000"/>
-              </a:lnSpc>
-              <a:spcBef>
-                <a:spcPts val="640"/>
-              </a:spcBef>
-              <a:spcAft>
-                <a:spcPts val="0"/>
-              </a:spcAft>
-              <a:buClr>
-                <a:schemeClr val="dk1"/>
-              </a:buClr>
-              <a:buSzPct val="25000"/>
-              <a:buFont typeface="Times New Roman"/>
-              <a:buNone/>
-            </a:pPr>
-            <a:r>
-              <a:rPr strike="noStrike" u="none" b="0" cap="none" baseline="0" sz="3200" lang="en-US" i="0">
-                <a:solidFill>
-                  <a:schemeClr val="dk1"/>
-                </a:solidFill>
-                <a:latin typeface="Times New Roman"/>
-                <a:ea typeface="Times New Roman"/>
-                <a:cs typeface="Times New Roman"/>
-                <a:sym typeface="Times New Roman"/>
-              </a:rPr>
-              <a:t>Sprint 2 user stories </a:t>
-            </a:r>
-            <a:r>
-              <a:rPr strike="noStrike" u="none" b="0" cap="none" baseline="0" sz="2000" lang="en-US" i="0">
-                <a:solidFill>
-                  <a:schemeClr val="dk1"/>
-                </a:solidFill>
-                <a:latin typeface="Times New Roman"/>
-                <a:ea typeface="Times New Roman"/>
-                <a:cs typeface="Times New Roman"/>
-                <a:sym typeface="Times New Roman"/>
-              </a:rPr>
-              <a:t>each labeled with assoc. high-level goal</a:t>
-            </a:r>
-          </a:p>
-          <a:p>
-            <a:pPr algn="l" rtl="0" lvl="0" marR="0" indent="0" marL="0">
-              <a:lnSpc>
-                <a:spcPct val="100000"/>
-              </a:lnSpc>
-              <a:spcBef>
-                <a:spcPts val="640"/>
-              </a:spcBef>
-              <a:spcAft>
-                <a:spcPts val="0"/>
-              </a:spcAft>
-              <a:buClr>
-                <a:schemeClr val="dk1"/>
-              </a:buClr>
-              <a:buSzPct val="25000"/>
-              <a:buFont typeface="Times New Roman"/>
-              <a:buNone/>
-            </a:pPr>
-            <a:r>
-              <a:rPr strike="noStrike" u="none" b="0" cap="none" baseline="0" sz="3200" lang="en-US" i="0">
-                <a:solidFill>
-                  <a:schemeClr val="dk1"/>
-                </a:solidFill>
-                <a:latin typeface="Times New Roman"/>
-                <a:ea typeface="Times New Roman"/>
-                <a:cs typeface="Times New Roman"/>
-                <a:sym typeface="Times New Roman"/>
-              </a:rPr>
-              <a:t>Sprint 3 user stories </a:t>
-            </a:r>
-            <a:r>
-              <a:rPr strike="noStrike" u="none" b="0" cap="none" baseline="0" sz="2000" lang="en-US" i="0">
-                <a:solidFill>
-                  <a:schemeClr val="dk1"/>
-                </a:solidFill>
-                <a:latin typeface="Times New Roman"/>
-                <a:ea typeface="Times New Roman"/>
-                <a:cs typeface="Times New Roman"/>
-                <a:sym typeface="Times New Roman"/>
-              </a:rPr>
-              <a:t>each labeled with assoc. high-level goal</a:t>
-            </a:r>
-          </a:p>
-          <a:p>
-            <a:pPr algn="l" rtl="0" lvl="0" marR="0" indent="0" marL="0">
-              <a:spcBef>
-                <a:spcPts val="0"/>
-              </a:spcBef>
-              <a:buNone/>
-            </a:pPr>
-            <a:r>
-              <a:t/>
-            </a:r>
-            <a:endParaRPr strike="noStrike" u="none" b="0" cap="none" baseline="0" sz="2000" i="0">
-              <a:solidFill>
-                <a:schemeClr val="dk1"/>
-              </a:solidFill>
-              <a:latin typeface="Times New Roman"/>
-              <a:ea typeface="Times New Roman"/>
-              <a:cs typeface="Times New Roman"/>
-              <a:sym typeface="Times New Roman"/>
-            </a:endParaRPr>
           </a:p>
         </p:txBody>
       </p:sp>
       <p:sp>
         <p:nvSpPr>
-          <p:cNvPr id="70" name="Shape 70"/>
+          <p:cNvPr id="71" name="Shape 71"/>
           <p:cNvSpPr txBox="1"/>
           <p:nvPr/>
         </p:nvSpPr>

</xml_diff>